<commit_message>
Upgrade solution to .net 9 Upgrade some NuGet packages Remove redundant chat gpt deployment
</commit_message>
<xml_diff>
--- a/JaaS.pptx
+++ b/JaaS.pptx
@@ -3652,7 +3652,7 @@
           <a:p>
             <a:fld id="{1949DCC4-3950-4EDD-A7AB-6E741F409A1B}" type="datetimeFigureOut">
               <a:rPr lang="en-GB" smtClean="0"/>
-              <a:t>14/03/2024</a:t>
+              <a:t>25/04/2024</a:t>
             </a:fld>
             <a:endParaRPr lang="en-GB"/>
           </a:p>
@@ -3829,7 +3829,7 @@
           <a:p>
             <a:fld id="{4272BD98-83E6-44AA-A390-E720F46AD6BB}" type="datetimeFigureOut">
               <a:rPr lang="en-GB" smtClean="0"/>
-              <a:t>14/03/2024</a:t>
+              <a:t>25/04/2024</a:t>
             </a:fld>
             <a:endParaRPr lang="en-GB"/>
           </a:p>
@@ -4819,7 +4819,7 @@
           <a:p>
             <a:fld id="{2239D842-4202-406B-B506-E26DA8C90340}" type="datetimeFigureOut">
               <a:rPr lang="en-GB" smtClean="0"/>
-              <a:t>14/03/2024</a:t>
+              <a:t>25/04/2024</a:t>
             </a:fld>
             <a:endParaRPr lang="en-GB"/>
           </a:p>
@@ -5070,7 +5070,7 @@
           <a:p>
             <a:fld id="{2239D842-4202-406B-B506-E26DA8C90340}" type="datetimeFigureOut">
               <a:rPr lang="en-GB" smtClean="0"/>
-              <a:t>14/03/2024</a:t>
+              <a:t>25/04/2024</a:t>
             </a:fld>
             <a:endParaRPr lang="en-GB"/>
           </a:p>
@@ -5384,7 +5384,7 @@
           <a:p>
             <a:fld id="{2239D842-4202-406B-B506-E26DA8C90340}" type="datetimeFigureOut">
               <a:rPr lang="en-GB" smtClean="0"/>
-              <a:t>14/03/2024</a:t>
+              <a:t>25/04/2024</a:t>
             </a:fld>
             <a:endParaRPr lang="en-GB"/>
           </a:p>
@@ -5725,7 +5725,7 @@
           <a:p>
             <a:fld id="{2239D842-4202-406B-B506-E26DA8C90340}" type="datetimeFigureOut">
               <a:rPr lang="en-GB" smtClean="0"/>
-              <a:t>14/03/2024</a:t>
+              <a:t>25/04/2024</a:t>
             </a:fld>
             <a:endParaRPr lang="en-GB"/>
           </a:p>
@@ -6039,7 +6039,7 @@
           <a:p>
             <a:fld id="{2239D842-4202-406B-B506-E26DA8C90340}" type="datetimeFigureOut">
               <a:rPr lang="en-GB" smtClean="0"/>
-              <a:t>14/03/2024</a:t>
+              <a:t>25/04/2024</a:t>
             </a:fld>
             <a:endParaRPr lang="en-GB"/>
           </a:p>
@@ -6432,7 +6432,7 @@
           <a:p>
             <a:fld id="{2239D842-4202-406B-B506-E26DA8C90340}" type="datetimeFigureOut">
               <a:rPr lang="en-GB" smtClean="0"/>
-              <a:t>14/03/2024</a:t>
+              <a:t>25/04/2024</a:t>
             </a:fld>
             <a:endParaRPr lang="en-GB"/>
           </a:p>
@@ -6602,7 +6602,7 @@
           <a:p>
             <a:fld id="{2239D842-4202-406B-B506-E26DA8C90340}" type="datetimeFigureOut">
               <a:rPr lang="en-GB" smtClean="0"/>
-              <a:t>14/03/2024</a:t>
+              <a:t>25/04/2024</a:t>
             </a:fld>
             <a:endParaRPr lang="en-GB"/>
           </a:p>
@@ -6782,7 +6782,7 @@
           <a:p>
             <a:fld id="{2239D842-4202-406B-B506-E26DA8C90340}" type="datetimeFigureOut">
               <a:rPr lang="en-GB" smtClean="0"/>
-              <a:t>14/03/2024</a:t>
+              <a:t>25/04/2024</a:t>
             </a:fld>
             <a:endParaRPr lang="en-GB"/>
           </a:p>
@@ -6958,7 +6958,7 @@
           <a:p>
             <a:fld id="{2239D842-4202-406B-B506-E26DA8C90340}" type="datetimeFigureOut">
               <a:rPr lang="en-GB" smtClean="0"/>
-              <a:t>14/03/2024</a:t>
+              <a:t>25/04/2024</a:t>
             </a:fld>
             <a:endParaRPr lang="en-GB"/>
           </a:p>
@@ -7205,7 +7205,7 @@
           <a:p>
             <a:fld id="{2239D842-4202-406B-B506-E26DA8C90340}" type="datetimeFigureOut">
               <a:rPr lang="en-GB" smtClean="0"/>
-              <a:t>14/03/2024</a:t>
+              <a:t>25/04/2024</a:t>
             </a:fld>
             <a:endParaRPr lang="en-GB"/>
           </a:p>
@@ -7437,7 +7437,7 @@
           <a:p>
             <a:fld id="{2239D842-4202-406B-B506-E26DA8C90340}" type="datetimeFigureOut">
               <a:rPr lang="en-GB" smtClean="0"/>
-              <a:t>14/03/2024</a:t>
+              <a:t>25/04/2024</a:t>
             </a:fld>
             <a:endParaRPr lang="en-GB"/>
           </a:p>
@@ -7811,7 +7811,7 @@
           <a:p>
             <a:fld id="{2239D842-4202-406B-B506-E26DA8C90340}" type="datetimeFigureOut">
               <a:rPr lang="en-GB" smtClean="0"/>
-              <a:t>14/03/2024</a:t>
+              <a:t>25/04/2024</a:t>
             </a:fld>
             <a:endParaRPr lang="en-GB"/>
           </a:p>
@@ -7934,7 +7934,7 @@
           <a:p>
             <a:fld id="{2239D842-4202-406B-B506-E26DA8C90340}" type="datetimeFigureOut">
               <a:rPr lang="en-GB" smtClean="0"/>
-              <a:t>14/03/2024</a:t>
+              <a:t>25/04/2024</a:t>
             </a:fld>
             <a:endParaRPr lang="en-GB"/>
           </a:p>
@@ -8029,7 +8029,7 @@
           <a:p>
             <a:fld id="{2239D842-4202-406B-B506-E26DA8C90340}" type="datetimeFigureOut">
               <a:rPr lang="en-GB" smtClean="0"/>
-              <a:t>14/03/2024</a:t>
+              <a:t>25/04/2024</a:t>
             </a:fld>
             <a:endParaRPr lang="en-GB"/>
           </a:p>
@@ -8284,7 +8284,7 @@
           <a:p>
             <a:fld id="{2239D842-4202-406B-B506-E26DA8C90340}" type="datetimeFigureOut">
               <a:rPr lang="en-GB" smtClean="0"/>
-              <a:t>14/03/2024</a:t>
+              <a:t>25/04/2024</a:t>
             </a:fld>
             <a:endParaRPr lang="en-GB"/>
           </a:p>
@@ -8547,7 +8547,7 @@
           <a:p>
             <a:fld id="{2239D842-4202-406B-B506-E26DA8C90340}" type="datetimeFigureOut">
               <a:rPr lang="en-GB" smtClean="0"/>
-              <a:t>14/03/2024</a:t>
+              <a:t>25/04/2024</a:t>
             </a:fld>
             <a:endParaRPr lang="en-GB"/>
           </a:p>
@@ -9290,7 +9290,7 @@
           <a:p>
             <a:fld id="{2239D842-4202-406B-B506-E26DA8C90340}" type="datetimeFigureOut">
               <a:rPr lang="en-GB" smtClean="0"/>
-              <a:t>14/03/2024</a:t>
+              <a:t>25/04/2024</a:t>
             </a:fld>
             <a:endParaRPr lang="en-GB"/>
           </a:p>
@@ -9903,7 +9903,7 @@
                 <a:latin typeface="Times New Roman" panose="02020603050405020304" pitchFamily="18" charset="0"/>
                 <a:cs typeface="Lucida Sans Unicode" panose="020B0602030504020204" pitchFamily="34" charset="0"/>
               </a:rPr>
-              <a:t>14/03/2024</a:t>
+              <a:t>25/04/2024</a:t>
             </a:r>
           </a:p>
           <a:p>

</xml_diff>

<commit_message>
Amend test for latest version of chatgpt
</commit_message>
<xml_diff>
--- a/JaaS.pptx
+++ b/JaaS.pptx
@@ -3652,7 +3652,7 @@
           <a:p>
             <a:fld id="{1949DCC4-3950-4EDD-A7AB-6E741F409A1B}" type="datetimeFigureOut">
               <a:rPr lang="en-GB" smtClean="0"/>
-              <a:t>25/04/2024</a:t>
+              <a:t>04/02/2025</a:t>
             </a:fld>
             <a:endParaRPr lang="en-GB"/>
           </a:p>
@@ -3829,7 +3829,7 @@
           <a:p>
             <a:fld id="{4272BD98-83E6-44AA-A390-E720F46AD6BB}" type="datetimeFigureOut">
               <a:rPr lang="en-GB" smtClean="0"/>
-              <a:t>25/04/2024</a:t>
+              <a:t>04/02/2025</a:t>
             </a:fld>
             <a:endParaRPr lang="en-GB"/>
           </a:p>
@@ -4819,7 +4819,7 @@
           <a:p>
             <a:fld id="{2239D842-4202-406B-B506-E26DA8C90340}" type="datetimeFigureOut">
               <a:rPr lang="en-GB" smtClean="0"/>
-              <a:t>25/04/2024</a:t>
+              <a:t>04/02/2025</a:t>
             </a:fld>
             <a:endParaRPr lang="en-GB"/>
           </a:p>
@@ -5070,7 +5070,7 @@
           <a:p>
             <a:fld id="{2239D842-4202-406B-B506-E26DA8C90340}" type="datetimeFigureOut">
               <a:rPr lang="en-GB" smtClean="0"/>
-              <a:t>25/04/2024</a:t>
+              <a:t>04/02/2025</a:t>
             </a:fld>
             <a:endParaRPr lang="en-GB"/>
           </a:p>
@@ -5384,7 +5384,7 @@
           <a:p>
             <a:fld id="{2239D842-4202-406B-B506-E26DA8C90340}" type="datetimeFigureOut">
               <a:rPr lang="en-GB" smtClean="0"/>
-              <a:t>25/04/2024</a:t>
+              <a:t>04/02/2025</a:t>
             </a:fld>
             <a:endParaRPr lang="en-GB"/>
           </a:p>
@@ -5725,7 +5725,7 @@
           <a:p>
             <a:fld id="{2239D842-4202-406B-B506-E26DA8C90340}" type="datetimeFigureOut">
               <a:rPr lang="en-GB" smtClean="0"/>
-              <a:t>25/04/2024</a:t>
+              <a:t>04/02/2025</a:t>
             </a:fld>
             <a:endParaRPr lang="en-GB"/>
           </a:p>
@@ -6039,7 +6039,7 @@
           <a:p>
             <a:fld id="{2239D842-4202-406B-B506-E26DA8C90340}" type="datetimeFigureOut">
               <a:rPr lang="en-GB" smtClean="0"/>
-              <a:t>25/04/2024</a:t>
+              <a:t>04/02/2025</a:t>
             </a:fld>
             <a:endParaRPr lang="en-GB"/>
           </a:p>
@@ -6432,7 +6432,7 @@
           <a:p>
             <a:fld id="{2239D842-4202-406B-B506-E26DA8C90340}" type="datetimeFigureOut">
               <a:rPr lang="en-GB" smtClean="0"/>
-              <a:t>25/04/2024</a:t>
+              <a:t>04/02/2025</a:t>
             </a:fld>
             <a:endParaRPr lang="en-GB"/>
           </a:p>
@@ -6602,7 +6602,7 @@
           <a:p>
             <a:fld id="{2239D842-4202-406B-B506-E26DA8C90340}" type="datetimeFigureOut">
               <a:rPr lang="en-GB" smtClean="0"/>
-              <a:t>25/04/2024</a:t>
+              <a:t>04/02/2025</a:t>
             </a:fld>
             <a:endParaRPr lang="en-GB"/>
           </a:p>
@@ -6782,7 +6782,7 @@
           <a:p>
             <a:fld id="{2239D842-4202-406B-B506-E26DA8C90340}" type="datetimeFigureOut">
               <a:rPr lang="en-GB" smtClean="0"/>
-              <a:t>25/04/2024</a:t>
+              <a:t>04/02/2025</a:t>
             </a:fld>
             <a:endParaRPr lang="en-GB"/>
           </a:p>
@@ -6958,7 +6958,7 @@
           <a:p>
             <a:fld id="{2239D842-4202-406B-B506-E26DA8C90340}" type="datetimeFigureOut">
               <a:rPr lang="en-GB" smtClean="0"/>
-              <a:t>25/04/2024</a:t>
+              <a:t>04/02/2025</a:t>
             </a:fld>
             <a:endParaRPr lang="en-GB"/>
           </a:p>
@@ -7205,7 +7205,7 @@
           <a:p>
             <a:fld id="{2239D842-4202-406B-B506-E26DA8C90340}" type="datetimeFigureOut">
               <a:rPr lang="en-GB" smtClean="0"/>
-              <a:t>25/04/2024</a:t>
+              <a:t>04/02/2025</a:t>
             </a:fld>
             <a:endParaRPr lang="en-GB"/>
           </a:p>
@@ -7437,7 +7437,7 @@
           <a:p>
             <a:fld id="{2239D842-4202-406B-B506-E26DA8C90340}" type="datetimeFigureOut">
               <a:rPr lang="en-GB" smtClean="0"/>
-              <a:t>25/04/2024</a:t>
+              <a:t>04/02/2025</a:t>
             </a:fld>
             <a:endParaRPr lang="en-GB"/>
           </a:p>
@@ -7811,7 +7811,7 @@
           <a:p>
             <a:fld id="{2239D842-4202-406B-B506-E26DA8C90340}" type="datetimeFigureOut">
               <a:rPr lang="en-GB" smtClean="0"/>
-              <a:t>25/04/2024</a:t>
+              <a:t>04/02/2025</a:t>
             </a:fld>
             <a:endParaRPr lang="en-GB"/>
           </a:p>
@@ -7934,7 +7934,7 @@
           <a:p>
             <a:fld id="{2239D842-4202-406B-B506-E26DA8C90340}" type="datetimeFigureOut">
               <a:rPr lang="en-GB" smtClean="0"/>
-              <a:t>25/04/2024</a:t>
+              <a:t>04/02/2025</a:t>
             </a:fld>
             <a:endParaRPr lang="en-GB"/>
           </a:p>
@@ -8029,7 +8029,7 @@
           <a:p>
             <a:fld id="{2239D842-4202-406B-B506-E26DA8C90340}" type="datetimeFigureOut">
               <a:rPr lang="en-GB" smtClean="0"/>
-              <a:t>25/04/2024</a:t>
+              <a:t>04/02/2025</a:t>
             </a:fld>
             <a:endParaRPr lang="en-GB"/>
           </a:p>
@@ -8284,7 +8284,7 @@
           <a:p>
             <a:fld id="{2239D842-4202-406B-B506-E26DA8C90340}" type="datetimeFigureOut">
               <a:rPr lang="en-GB" smtClean="0"/>
-              <a:t>25/04/2024</a:t>
+              <a:t>04/02/2025</a:t>
             </a:fld>
             <a:endParaRPr lang="en-GB"/>
           </a:p>
@@ -8547,7 +8547,7 @@
           <a:p>
             <a:fld id="{2239D842-4202-406B-B506-E26DA8C90340}" type="datetimeFigureOut">
               <a:rPr lang="en-GB" smtClean="0"/>
-              <a:t>25/04/2024</a:t>
+              <a:t>04/02/2025</a:t>
             </a:fld>
             <a:endParaRPr lang="en-GB"/>
           </a:p>
@@ -9290,7 +9290,7 @@
           <a:p>
             <a:fld id="{2239D842-4202-406B-B506-E26DA8C90340}" type="datetimeFigureOut">
               <a:rPr lang="en-GB" smtClean="0"/>
-              <a:t>25/04/2024</a:t>
+              <a:t>04/02/2025</a:t>
             </a:fld>
             <a:endParaRPr lang="en-GB"/>
           </a:p>
@@ -9896,15 +9896,22 @@
               <a:buClrTx/>
             </a:pPr>
             <a:r>
-              <a:rPr lang="en-GB" altLang="en-US" dirty="0">
+              <a:rPr lang="en-GB" altLang="en-US">
                 <a:solidFill>
                   <a:srgbClr val="000000"/>
                 </a:solidFill>
                 <a:latin typeface="Times New Roman" panose="02020603050405020304" pitchFamily="18" charset="0"/>
                 <a:cs typeface="Lucida Sans Unicode" panose="020B0602030504020204" pitchFamily="34" charset="0"/>
               </a:rPr>
-              <a:t>25/04/2024</a:t>
-            </a:r>
+              <a:t>01/04/2025</a:t>
+            </a:r>
+            <a:endParaRPr lang="en-GB" altLang="en-US" dirty="0">
+              <a:solidFill>
+                <a:srgbClr val="000000"/>
+              </a:solidFill>
+              <a:latin typeface="Times New Roman" panose="02020603050405020304" pitchFamily="18" charset="0"/>
+              <a:cs typeface="Lucida Sans Unicode" panose="020B0602030504020204" pitchFamily="34" charset="0"/>
+            </a:endParaRPr>
           </a:p>
           <a:p>
             <a:pPr>
@@ -10494,7 +10501,7 @@
           <a:p>
             <a:r>
               <a:rPr lang="en-GB" dirty="0"/>
-              <a:t>Azure Open AI studio</a:t>
+              <a:t>Azure Open AI Foundry</a:t>
             </a:r>
           </a:p>
           <a:p>

</xml_diff>